<commit_message>
Updated day 2 home slides
</commit_message>
<xml_diff>
--- a/prezentacije/WebAPI/2-1 REST Servisi-WebAPI.pptx
+++ b/prezentacije/WebAPI/2-1 REST Servisi-WebAPI.pptx
@@ -5,17 +5,16 @@
     <p:sldMasterId id="2147483648" r:id="rId1"/>
   </p:sldMasterIdLst>
   <p:notesMasterIdLst>
-    <p:notesMasterId r:id="rId10"/>
+    <p:notesMasterId r:id="rId9"/>
   </p:notesMasterIdLst>
   <p:sldIdLst>
-    <p:sldId id="256" r:id="rId2"/>
+    <p:sldId id="264" r:id="rId2"/>
     <p:sldId id="258" r:id="rId3"/>
     <p:sldId id="257" r:id="rId4"/>
     <p:sldId id="260" r:id="rId5"/>
     <p:sldId id="261" r:id="rId6"/>
     <p:sldId id="259" r:id="rId7"/>
     <p:sldId id="262" r:id="rId8"/>
-    <p:sldId id="263" r:id="rId9"/>
   </p:sldIdLst>
   <p:sldSz cx="12192000" cy="6858000"/>
   <p:notesSz cx="6858000" cy="9144000"/>
@@ -204,7 +203,7 @@
           <a:p>
             <a:fld id="{B4456A61-EDA5-4143-93D8-8630262F9B53}" type="datetimeFigureOut">
               <a:rPr lang="hr-HR" smtClean="0"/>
-              <a:t>4.4.2017.</a:t>
+              <a:t>1.5.2017.</a:t>
             </a:fld>
             <a:endParaRPr lang="hr-HR"/>
           </a:p>
@@ -3155,161 +3154,6 @@
 </p:notes>
 </file>
 
-<file path=ppt/notesSlides/notesSlide7.xml><?xml version="1.0" encoding="utf-8"?>
-<p:notes xmlns:a="http://schemas.openxmlformats.org/drawingml/2006/main" xmlns:r="http://schemas.openxmlformats.org/officeDocument/2006/relationships" xmlns:p="http://schemas.openxmlformats.org/presentationml/2006/main">
-  <p:cSld>
-    <p:spTree>
-      <p:nvGrpSpPr>
-        <p:cNvPr id="1" name=""/>
-        <p:cNvGrpSpPr/>
-        <p:nvPr/>
-      </p:nvGrpSpPr>
-      <p:grpSpPr>
-        <a:xfrm>
-          <a:off x="0" y="0"/>
-          <a:ext cx="0" cy="0"/>
-          <a:chOff x="0" y="0"/>
-          <a:chExt cx="0" cy="0"/>
-        </a:xfrm>
-      </p:grpSpPr>
-      <p:sp>
-        <p:nvSpPr>
-          <p:cNvPr id="2" name="Slide Image Placeholder 1"/>
-          <p:cNvSpPr>
-            <a:spLocks noGrp="1" noRot="1" noChangeAspect="1"/>
-          </p:cNvSpPr>
-          <p:nvPr>
-            <p:ph type="sldImg"/>
-          </p:nvPr>
-        </p:nvSpPr>
-        <p:spPr/>
-      </p:sp>
-      <p:sp>
-        <p:nvSpPr>
-          <p:cNvPr id="3" name="Notes Placeholder 2"/>
-          <p:cNvSpPr>
-            <a:spLocks noGrp="1"/>
-          </p:cNvSpPr>
-          <p:nvPr>
-            <p:ph type="body" idx="1"/>
-          </p:nvPr>
-        </p:nvSpPr>
-        <p:spPr/>
-        <p:txBody>
-          <a:bodyPr/>
-          <a:lstStyle/>
-          <a:p>
-            <a:r>
-              <a:rPr lang="hr-HR" dirty="0" smtClean="0"/>
-              <a:t>https://bitworking.org/news/201/RESTify-DayTrader</a:t>
-            </a:r>
-          </a:p>
-          <a:p>
-            <a:endParaRPr lang="hr-HR" dirty="0" smtClean="0"/>
-          </a:p>
-          <a:p>
-            <a:r>
-              <a:rPr lang="hr-HR" dirty="0" smtClean="0"/>
-              <a:t>Ideja:</a:t>
-            </a:r>
-            <a:r>
-              <a:rPr lang="hr-HR" baseline="0" dirty="0" smtClean="0"/>
-              <a:t> čisto odraditi jednu vježbu poput „how </a:t>
-            </a:r>
-            <a:r>
-              <a:rPr lang="hr-HR" baseline="0" dirty="0" err="1" smtClean="0"/>
-              <a:t>too</a:t>
-            </a:r>
-            <a:r>
-              <a:rPr lang="hr-HR" baseline="0" dirty="0" smtClean="0"/>
-              <a:t> </a:t>
-            </a:r>
-            <a:r>
-              <a:rPr lang="hr-HR" baseline="0" dirty="0" err="1" smtClean="0"/>
-              <a:t>expose</a:t>
-            </a:r>
-            <a:r>
-              <a:rPr lang="hr-HR" baseline="0" dirty="0" smtClean="0"/>
-              <a:t> </a:t>
-            </a:r>
-            <a:r>
-              <a:rPr lang="hr-HR" baseline="0" dirty="0" err="1" smtClean="0"/>
-              <a:t>any</a:t>
-            </a:r>
-            <a:r>
-              <a:rPr lang="hr-HR" baseline="0" dirty="0" smtClean="0"/>
-              <a:t> system to </a:t>
-            </a:r>
-            <a:r>
-              <a:rPr lang="hr-HR" baseline="0" dirty="0" err="1" smtClean="0"/>
-              <a:t>the</a:t>
-            </a:r>
-            <a:r>
-              <a:rPr lang="hr-HR" baseline="0" dirty="0" smtClean="0"/>
-              <a:t> </a:t>
-            </a:r>
-            <a:r>
-              <a:rPr lang="hr-HR" baseline="0" dirty="0" err="1" smtClean="0"/>
-              <a:t>outside</a:t>
-            </a:r>
-            <a:r>
-              <a:rPr lang="hr-HR" baseline="0" dirty="0" smtClean="0"/>
-              <a:t> </a:t>
-            </a:r>
-            <a:r>
-              <a:rPr lang="hr-HR" baseline="0" dirty="0" err="1" smtClean="0"/>
-              <a:t>world</a:t>
-            </a:r>
-            <a:r>
-              <a:rPr lang="hr-HR" baseline="0" smtClean="0"/>
-              <a:t>” </a:t>
-            </a:r>
-            <a:r>
-              <a:rPr lang="hr-HR" baseline="0" smtClean="0">
-                <a:sym typeface="Wingdings" panose="05000000000000000000" pitchFamily="2" charset="2"/>
-              </a:rPr>
-              <a:t></a:t>
-            </a:r>
-            <a:endParaRPr lang="hr-HR" dirty="0"/>
-          </a:p>
-        </p:txBody>
-      </p:sp>
-      <p:sp>
-        <p:nvSpPr>
-          <p:cNvPr id="4" name="Slide Number Placeholder 3"/>
-          <p:cNvSpPr>
-            <a:spLocks noGrp="1"/>
-          </p:cNvSpPr>
-          <p:nvPr>
-            <p:ph type="sldNum" sz="quarter" idx="10"/>
-          </p:nvPr>
-        </p:nvSpPr>
-        <p:spPr/>
-        <p:txBody>
-          <a:bodyPr/>
-          <a:lstStyle/>
-          <a:p>
-            <a:fld id="{EF9F0894-A979-4254-A883-6569A1802CEB}" type="slidenum">
-              <a:rPr lang="hr-HR" smtClean="0"/>
-              <a:t>8</a:t>
-            </a:fld>
-            <a:endParaRPr lang="hr-HR"/>
-          </a:p>
-        </p:txBody>
-      </p:sp>
-    </p:spTree>
-    <p:extLst>
-      <p:ext uri="{BB962C8B-B14F-4D97-AF65-F5344CB8AC3E}">
-        <p14:creationId xmlns:p14="http://schemas.microsoft.com/office/powerpoint/2010/main" val="1317940961"/>
-      </p:ext>
-    </p:extLst>
-  </p:cSld>
-  <p:clrMapOvr>
-    <a:masterClrMapping/>
-  </p:clrMapOvr>
-</p:notes>
-</file>
-
 <file path=ppt/slideLayouts/slideLayout1.xml><?xml version="1.0" encoding="utf-8"?>
 <p:sldLayout xmlns:a="http://schemas.openxmlformats.org/drawingml/2006/main" xmlns:r="http://schemas.openxmlformats.org/officeDocument/2006/relationships" xmlns:p="http://schemas.openxmlformats.org/presentationml/2006/main" type="title" preserve="1">
   <p:cSld name="Title Slide">
@@ -3441,7 +3285,7 @@
           <a:p>
             <a:fld id="{AE97022B-3D63-445C-8DEA-85C886D5E45D}" type="datetimeFigureOut">
               <a:rPr lang="hr-HR" smtClean="0"/>
-              <a:t>4.4.2017.</a:t>
+              <a:t>1.5.2017.</a:t>
             </a:fld>
             <a:endParaRPr lang="hr-HR"/>
           </a:p>
@@ -3611,7 +3455,7 @@
           <a:p>
             <a:fld id="{AE97022B-3D63-445C-8DEA-85C886D5E45D}" type="datetimeFigureOut">
               <a:rPr lang="hr-HR" smtClean="0"/>
-              <a:t>4.4.2017.</a:t>
+              <a:t>1.5.2017.</a:t>
             </a:fld>
             <a:endParaRPr lang="hr-HR"/>
           </a:p>
@@ -3791,7 +3635,7 @@
           <a:p>
             <a:fld id="{AE97022B-3D63-445C-8DEA-85C886D5E45D}" type="datetimeFigureOut">
               <a:rPr lang="hr-HR" smtClean="0"/>
-              <a:t>4.4.2017.</a:t>
+              <a:t>1.5.2017.</a:t>
             </a:fld>
             <a:endParaRPr lang="hr-HR"/>
           </a:p>
@@ -3961,7 +3805,7 @@
           <a:p>
             <a:fld id="{AE97022B-3D63-445C-8DEA-85C886D5E45D}" type="datetimeFigureOut">
               <a:rPr lang="hr-HR" smtClean="0"/>
-              <a:t>4.4.2017.</a:t>
+              <a:t>1.5.2017.</a:t>
             </a:fld>
             <a:endParaRPr lang="hr-HR"/>
           </a:p>
@@ -4207,7 +4051,7 @@
           <a:p>
             <a:fld id="{AE97022B-3D63-445C-8DEA-85C886D5E45D}" type="datetimeFigureOut">
               <a:rPr lang="hr-HR" smtClean="0"/>
-              <a:t>4.4.2017.</a:t>
+              <a:t>1.5.2017.</a:t>
             </a:fld>
             <a:endParaRPr lang="hr-HR"/>
           </a:p>
@@ -4439,7 +4283,7 @@
           <a:p>
             <a:fld id="{AE97022B-3D63-445C-8DEA-85C886D5E45D}" type="datetimeFigureOut">
               <a:rPr lang="hr-HR" smtClean="0"/>
-              <a:t>4.4.2017.</a:t>
+              <a:t>1.5.2017.</a:t>
             </a:fld>
             <a:endParaRPr lang="hr-HR"/>
           </a:p>
@@ -4806,7 +4650,7 @@
           <a:p>
             <a:fld id="{AE97022B-3D63-445C-8DEA-85C886D5E45D}" type="datetimeFigureOut">
               <a:rPr lang="hr-HR" smtClean="0"/>
-              <a:t>4.4.2017.</a:t>
+              <a:t>1.5.2017.</a:t>
             </a:fld>
             <a:endParaRPr lang="hr-HR"/>
           </a:p>
@@ -4924,7 +4768,7 @@
           <a:p>
             <a:fld id="{AE97022B-3D63-445C-8DEA-85C886D5E45D}" type="datetimeFigureOut">
               <a:rPr lang="hr-HR" smtClean="0"/>
-              <a:t>4.4.2017.</a:t>
+              <a:t>1.5.2017.</a:t>
             </a:fld>
             <a:endParaRPr lang="hr-HR"/>
           </a:p>
@@ -5019,7 +4863,7 @@
           <a:p>
             <a:fld id="{AE97022B-3D63-445C-8DEA-85C886D5E45D}" type="datetimeFigureOut">
               <a:rPr lang="hr-HR" smtClean="0"/>
-              <a:t>4.4.2017.</a:t>
+              <a:t>1.5.2017.</a:t>
             </a:fld>
             <a:endParaRPr lang="hr-HR"/>
           </a:p>
@@ -5296,7 +5140,7 @@
           <a:p>
             <a:fld id="{AE97022B-3D63-445C-8DEA-85C886D5E45D}" type="datetimeFigureOut">
               <a:rPr lang="hr-HR" smtClean="0"/>
-              <a:t>4.4.2017.</a:t>
+              <a:t>1.5.2017.</a:t>
             </a:fld>
             <a:endParaRPr lang="hr-HR"/>
           </a:p>
@@ -5549,7 +5393,7 @@
           <a:p>
             <a:fld id="{AE97022B-3D63-445C-8DEA-85C886D5E45D}" type="datetimeFigureOut">
               <a:rPr lang="hr-HR" smtClean="0"/>
-              <a:t>4.4.2017.</a:t>
+              <a:t>1.5.2017.</a:t>
             </a:fld>
             <a:endParaRPr lang="hr-HR"/>
           </a:p>
@@ -5762,7 +5606,7 @@
           <a:p>
             <a:fld id="{AE97022B-3D63-445C-8DEA-85C886D5E45D}" type="datetimeFigureOut">
               <a:rPr lang="hr-HR" smtClean="0"/>
-              <a:t>4.4.2017.</a:t>
+              <a:t>1.5.2017.</a:t>
             </a:fld>
             <a:endParaRPr lang="hr-HR"/>
           </a:p>
@@ -6167,6 +6011,29 @@
           <a:chExt cx="0" cy="0"/>
         </a:xfrm>
       </p:grpSpPr>
+      <p:pic>
+        <p:nvPicPr>
+          <p:cNvPr id="7" name="Picture 6"/>
+          <p:cNvPicPr>
+            <a:picLocks noChangeAspect="1"/>
+          </p:cNvPicPr>
+          <p:nvPr/>
+        </p:nvPicPr>
+        <p:blipFill rotWithShape="1">
+          <a:blip r:embed="rId2"/>
+          <a:srcRect l="27535" t="4176" r="27697" b="2733"/>
+          <a:stretch/>
+        </p:blipFill>
+        <p:spPr>
+          <a:xfrm>
+            <a:off x="3158836" y="2616273"/>
+            <a:ext cx="1625696" cy="1690255"/>
+          </a:xfrm>
+          <a:prstGeom prst="rect">
+            <a:avLst/>
+          </a:prstGeom>
+        </p:spPr>
+      </p:pic>
       <p:sp>
         <p:nvSpPr>
           <p:cNvPr id="2" name="Title 1"/>
@@ -6177,62 +6044,100 @@
             <p:ph type="ctrTitle"/>
           </p:nvPr>
         </p:nvSpPr>
-        <p:spPr/>
+        <p:spPr>
+          <a:xfrm>
+            <a:off x="1524000" y="171595"/>
+            <a:ext cx="9144000" cy="2387600"/>
+          </a:xfrm>
+        </p:spPr>
         <p:txBody>
           <a:bodyPr/>
           <a:lstStyle/>
           <a:p>
             <a:r>
+              <a:rPr lang="hr-HR" dirty="0"/>
+              <a:t>2-2 REST Servisi-</a:t>
+            </a:r>
+            <a:r>
+              <a:rPr lang="hr-HR" dirty="0" err="1"/>
+              <a:t>WebAPI</a:t>
+            </a:r>
+            <a:endParaRPr lang="hr-HR" dirty="0"/>
+          </a:p>
+        </p:txBody>
+      </p:sp>
+      <p:sp>
+        <p:nvSpPr>
+          <p:cNvPr id="3" name="Subtitle 2"/>
+          <p:cNvSpPr>
+            <a:spLocks noGrp="1"/>
+          </p:cNvSpPr>
+          <p:nvPr>
+            <p:ph type="subTitle" idx="1"/>
+          </p:nvPr>
+        </p:nvSpPr>
+        <p:spPr>
+          <a:xfrm>
+            <a:off x="1524000" y="4802765"/>
+            <a:ext cx="9144000" cy="1655762"/>
+          </a:xfrm>
+        </p:spPr>
+        <p:txBody>
+          <a:bodyPr>
+            <a:normAutofit lnSpcReduction="10000"/>
+          </a:bodyPr>
+          <a:lstStyle/>
+          <a:p>
+            <a:r>
               <a:rPr lang="hr-HR" dirty="0" smtClean="0"/>
-              <a:t>2-2 REST Servisi-</a:t>
-            </a:r>
-            <a:r>
-              <a:rPr lang="hr-HR" dirty="0" err="1" smtClean="0"/>
-              <a:t>WebAPI</a:t>
-            </a:r>
+              <a:t>Maro Marčinko</a:t>
+            </a:r>
+          </a:p>
+          <a:p>
+            <a:r>
+              <a:rPr lang="hr-HR" dirty="0" smtClean="0"/>
+              <a:t>Matija Hrženjak</a:t>
+            </a:r>
+          </a:p>
+          <a:p>
             <a:endParaRPr lang="hr-HR" dirty="0"/>
           </a:p>
-        </p:txBody>
-      </p:sp>
-      <p:sp>
-        <p:nvSpPr>
-          <p:cNvPr id="3" name="Subtitle 2"/>
-          <p:cNvSpPr>
-            <a:spLocks noGrp="1"/>
-          </p:cNvSpPr>
-          <p:nvPr>
-            <p:ph type="subTitle" idx="1"/>
-          </p:nvPr>
-        </p:nvSpPr>
-        <p:spPr/>
-        <p:txBody>
-          <a:bodyPr/>
-          <a:lstStyle/>
-          <a:p>
-            <a:r>
-              <a:rPr lang="hr-HR" dirty="0" err="1" smtClean="0"/>
-              <a:t>Angular</a:t>
-            </a:r>
+          <a:p>
             <a:r>
               <a:rPr lang="hr-HR" dirty="0" smtClean="0"/>
-              <a:t> 2 – MS </a:t>
-            </a:r>
-            <a:r>
-              <a:rPr lang="hr-HR" dirty="0" err="1" smtClean="0"/>
-              <a:t>Stack</a:t>
-            </a:r>
-            <a:r>
-              <a:rPr lang="hr-HR" dirty="0" smtClean="0"/>
-              <a:t> radionica</a:t>
+              <a:t>IN2, 2017.</a:t>
             </a:r>
             <a:endParaRPr lang="hr-HR" dirty="0"/>
           </a:p>
         </p:txBody>
       </p:sp>
+      <p:pic>
+        <p:nvPicPr>
+          <p:cNvPr id="8" name="Picture 7"/>
+          <p:cNvPicPr>
+            <a:picLocks noChangeAspect="1"/>
+          </p:cNvPicPr>
+          <p:nvPr/>
+        </p:nvPicPr>
+        <p:blipFill rotWithShape="1">
+          <a:blip r:embed="rId3"/>
+          <a:srcRect t="37740" b="36771"/>
+          <a:stretch/>
+        </p:blipFill>
+        <p:spPr>
+          <a:xfrm>
+            <a:off x="5418556" y="2950876"/>
+            <a:ext cx="4005820" cy="1021050"/>
+          </a:xfrm>
+          <a:prstGeom prst="rect">
+            <a:avLst/>
+          </a:prstGeom>
+        </p:spPr>
+      </p:pic>
     </p:spTree>
     <p:extLst>
       <p:ext uri="{BB962C8B-B14F-4D97-AF65-F5344CB8AC3E}">
-        <p14:creationId xmlns:p14="http://schemas.microsoft.com/office/powerpoint/2010/main" val="3108090750"/>
+        <p14:creationId xmlns:p14="http://schemas.microsoft.com/office/powerpoint/2010/main" val="1713503776"/>
       </p:ext>
     </p:extLst>
   </p:cSld>
@@ -7320,35 +7225,35 @@
                 <a:gridCol w="2103120">
                   <a:extLst>
                     <a:ext uri="{9D8B030D-6E8A-4147-A177-3AD203B41FA5}">
-                      <a16:colId xmlns:a16="http://schemas.microsoft.com/office/drawing/2014/main" val="2952822493"/>
+                      <a16:colId xmlns:a16="http://schemas.microsoft.com/office/drawing/2014/main" xmlns="" val="2952822493"/>
                     </a:ext>
                   </a:extLst>
                 </a:gridCol>
                 <a:gridCol w="2103120">
                   <a:extLst>
                     <a:ext uri="{9D8B030D-6E8A-4147-A177-3AD203B41FA5}">
-                      <a16:colId xmlns:a16="http://schemas.microsoft.com/office/drawing/2014/main" val="4175326159"/>
+                      <a16:colId xmlns:a16="http://schemas.microsoft.com/office/drawing/2014/main" xmlns="" val="4175326159"/>
                     </a:ext>
                   </a:extLst>
                 </a:gridCol>
                 <a:gridCol w="2103120">
                   <a:extLst>
                     <a:ext uri="{9D8B030D-6E8A-4147-A177-3AD203B41FA5}">
-                      <a16:colId xmlns:a16="http://schemas.microsoft.com/office/drawing/2014/main" val="692725703"/>
+                      <a16:colId xmlns:a16="http://schemas.microsoft.com/office/drawing/2014/main" xmlns="" val="692725703"/>
                     </a:ext>
                   </a:extLst>
                 </a:gridCol>
                 <a:gridCol w="2103120">
                   <a:extLst>
                     <a:ext uri="{9D8B030D-6E8A-4147-A177-3AD203B41FA5}">
-                      <a16:colId xmlns:a16="http://schemas.microsoft.com/office/drawing/2014/main" val="3622829631"/>
+                      <a16:colId xmlns:a16="http://schemas.microsoft.com/office/drawing/2014/main" xmlns="" val="3622829631"/>
                     </a:ext>
                   </a:extLst>
                 </a:gridCol>
                 <a:gridCol w="2103120">
                   <a:extLst>
                     <a:ext uri="{9D8B030D-6E8A-4147-A177-3AD203B41FA5}">
-                      <a16:colId xmlns:a16="http://schemas.microsoft.com/office/drawing/2014/main" val="585926681"/>
+                      <a16:colId xmlns:a16="http://schemas.microsoft.com/office/drawing/2014/main" xmlns="" val="585926681"/>
                     </a:ext>
                   </a:extLst>
                 </a:gridCol>
@@ -7426,7 +7331,7 @@
                 </a:tc>
                 <a:extLst>
                   <a:ext uri="{0D108BD9-81ED-4DB2-BD59-A6C34878D82A}">
-                    <a16:rowId xmlns:a16="http://schemas.microsoft.com/office/drawing/2014/main" val="3596705335"/>
+                    <a16:rowId xmlns:a16="http://schemas.microsoft.com/office/drawing/2014/main" xmlns="" val="3596705335"/>
                   </a:ext>
                 </a:extLst>
               </a:tr>
@@ -7704,7 +7609,7 @@
                 </a:tc>
                 <a:extLst>
                   <a:ext uri="{0D108BD9-81ED-4DB2-BD59-A6C34878D82A}">
-                    <a16:rowId xmlns:a16="http://schemas.microsoft.com/office/drawing/2014/main" val="1475106142"/>
+                    <a16:rowId xmlns:a16="http://schemas.microsoft.com/office/drawing/2014/main" xmlns="" val="1475106142"/>
                   </a:ext>
                 </a:extLst>
               </a:tr>
@@ -8024,7 +7929,7 @@
                 </a:tc>
                 <a:extLst>
                   <a:ext uri="{0D108BD9-81ED-4DB2-BD59-A6C34878D82A}">
-                    <a16:rowId xmlns:a16="http://schemas.microsoft.com/office/drawing/2014/main" val="1864186061"/>
+                    <a16:rowId xmlns:a16="http://schemas.microsoft.com/office/drawing/2014/main" xmlns="" val="1864186061"/>
                   </a:ext>
                 </a:extLst>
               </a:tr>
@@ -8362,7 +8267,7 @@
                 </a:tc>
                 <a:extLst>
                   <a:ext uri="{0D108BD9-81ED-4DB2-BD59-A6C34878D82A}">
-                    <a16:rowId xmlns:a16="http://schemas.microsoft.com/office/drawing/2014/main" val="3438370969"/>
+                    <a16:rowId xmlns:a16="http://schemas.microsoft.com/office/drawing/2014/main" xmlns="" val="3438370969"/>
                   </a:ext>
                 </a:extLst>
               </a:tr>
@@ -8463,133 +8368,6 @@
     <p:extLst>
       <p:ext uri="{BB962C8B-B14F-4D97-AF65-F5344CB8AC3E}">
         <p14:creationId xmlns:p14="http://schemas.microsoft.com/office/powerpoint/2010/main" val="923482590"/>
-      </p:ext>
-    </p:extLst>
-  </p:cSld>
-  <p:clrMapOvr>
-    <a:masterClrMapping/>
-  </p:clrMapOvr>
-</p:sld>
-</file>
-
-<file path=ppt/slides/slide8.xml><?xml version="1.0" encoding="utf-8"?>
-<p:sld xmlns:a="http://schemas.openxmlformats.org/drawingml/2006/main" xmlns:r="http://schemas.openxmlformats.org/officeDocument/2006/relationships" xmlns:p="http://schemas.openxmlformats.org/presentationml/2006/main">
-  <p:cSld>
-    <p:spTree>
-      <p:nvGrpSpPr>
-        <p:cNvPr id="1" name=""/>
-        <p:cNvGrpSpPr/>
-        <p:nvPr/>
-      </p:nvGrpSpPr>
-      <p:grpSpPr>
-        <a:xfrm>
-          <a:off x="0" y="0"/>
-          <a:ext cx="0" cy="0"/>
-          <a:chOff x="0" y="0"/>
-          <a:chExt cx="0" cy="0"/>
-        </a:xfrm>
-      </p:grpSpPr>
-      <p:sp>
-        <p:nvSpPr>
-          <p:cNvPr id="2" name="Title 1"/>
-          <p:cNvSpPr>
-            <a:spLocks noGrp="1"/>
-          </p:cNvSpPr>
-          <p:nvPr>
-            <p:ph type="title"/>
-          </p:nvPr>
-        </p:nvSpPr>
-        <p:spPr/>
-        <p:txBody>
-          <a:bodyPr/>
-          <a:lstStyle/>
-          <a:p>
-            <a:r>
-              <a:rPr lang="hr-HR" dirty="0" smtClean="0"/>
-              <a:t>Primjer – </a:t>
-            </a:r>
-            <a:r>
-              <a:rPr lang="hr-HR" dirty="0" err="1" smtClean="0"/>
-              <a:t>ispoljavanje</a:t>
-            </a:r>
-            <a:r>
-              <a:rPr lang="hr-HR" dirty="0" smtClean="0"/>
-              <a:t> sistema prema vanka</a:t>
-            </a:r>
-            <a:endParaRPr lang="hr-HR" dirty="0"/>
-          </a:p>
-        </p:txBody>
-      </p:sp>
-      <p:sp>
-        <p:nvSpPr>
-          <p:cNvPr id="3" name="Content Placeholder 2"/>
-          <p:cNvSpPr>
-            <a:spLocks noGrp="1"/>
-          </p:cNvSpPr>
-          <p:nvPr>
-            <p:ph idx="1"/>
-          </p:nvPr>
-        </p:nvSpPr>
-        <p:spPr/>
-        <p:txBody>
-          <a:bodyPr/>
-          <a:lstStyle/>
-          <a:p>
-            <a:r>
-              <a:rPr lang="en-US" dirty="0"/>
-              <a:t>RESTful web service for </a:t>
-            </a:r>
-            <a:r>
-              <a:rPr lang="en-US" dirty="0" err="1" smtClean="0"/>
-              <a:t>DayTrader</a:t>
-            </a:r>
-            <a:endParaRPr lang="hr-HR" dirty="0" smtClean="0"/>
-          </a:p>
-          <a:p>
-            <a:r>
-              <a:rPr lang="hr-HR" dirty="0" smtClean="0"/>
-              <a:t>API - definiranje:</a:t>
-            </a:r>
-          </a:p>
-          <a:p>
-            <a:pPr lvl="1"/>
-            <a:endParaRPr lang="hr-HR" dirty="0"/>
-          </a:p>
-          <a:p>
-            <a:r>
-              <a:rPr lang="hr-HR" dirty="0" smtClean="0"/>
-              <a:t>Prepoznavanje </a:t>
-            </a:r>
-            <a:r>
-              <a:rPr lang="hr-HR" dirty="0" err="1" smtClean="0"/>
-              <a:t>root</a:t>
-            </a:r>
-            <a:r>
-              <a:rPr lang="hr-HR" dirty="0" smtClean="0"/>
-              <a:t> URI-a (AKA API </a:t>
-            </a:r>
-            <a:r>
-              <a:rPr lang="hr-HR" dirty="0" err="1" smtClean="0"/>
-              <a:t>Controller</a:t>
-            </a:r>
-            <a:r>
-              <a:rPr lang="hr-HR" dirty="0" smtClean="0"/>
-              <a:t>)</a:t>
-            </a:r>
-          </a:p>
-          <a:p>
-            <a:r>
-              <a:rPr lang="hr-HR" dirty="0" smtClean="0"/>
-              <a:t> </a:t>
-            </a:r>
-            <a:endParaRPr lang="hr-HR" dirty="0"/>
-          </a:p>
-        </p:txBody>
-      </p:sp>
-    </p:spTree>
-    <p:extLst>
-      <p:ext uri="{BB962C8B-B14F-4D97-AF65-F5344CB8AC3E}">
-        <p14:creationId xmlns:p14="http://schemas.microsoft.com/office/powerpoint/2010/main" val="1012616500"/>
       </p:ext>
     </p:extLst>
   </p:cSld>

</xml_diff>